<commit_message>
Update video page and images
</commit_message>
<xml_diff>
--- a/images/v_tracing.pptx
+++ b/images/v_tracing.pptx
@@ -245,7 +245,7 @@
           <a:p>
             <a:fld id="{E5CACD5D-5136-124F-89D7-18C7BEDAA641}" type="datetimeFigureOut">
               <a:rPr lang="en-US" smtClean="0"/>
-              <a:t>1/14/19</a:t>
+              <a:t>2/27/19</a:t>
             </a:fld>
             <a:endParaRPr lang="en-US"/>
           </a:p>
@@ -413,7 +413,7 @@
           <a:p>
             <a:fld id="{E5CACD5D-5136-124F-89D7-18C7BEDAA641}" type="datetimeFigureOut">
               <a:rPr lang="en-US" smtClean="0"/>
-              <a:t>1/14/19</a:t>
+              <a:t>2/27/19</a:t>
             </a:fld>
             <a:endParaRPr lang="en-US"/>
           </a:p>
@@ -591,7 +591,7 @@
           <a:p>
             <a:fld id="{E5CACD5D-5136-124F-89D7-18C7BEDAA641}" type="datetimeFigureOut">
               <a:rPr lang="en-US" smtClean="0"/>
-              <a:t>1/14/19</a:t>
+              <a:t>2/27/19</a:t>
             </a:fld>
             <a:endParaRPr lang="en-US"/>
           </a:p>
@@ -759,7 +759,7 @@
           <a:p>
             <a:fld id="{E5CACD5D-5136-124F-89D7-18C7BEDAA641}" type="datetimeFigureOut">
               <a:rPr lang="en-US" smtClean="0"/>
-              <a:t>1/14/19</a:t>
+              <a:t>2/27/19</a:t>
             </a:fld>
             <a:endParaRPr lang="en-US"/>
           </a:p>
@@ -1004,7 +1004,7 @@
           <a:p>
             <a:fld id="{E5CACD5D-5136-124F-89D7-18C7BEDAA641}" type="datetimeFigureOut">
               <a:rPr lang="en-US" smtClean="0"/>
-              <a:t>1/14/19</a:t>
+              <a:t>2/27/19</a:t>
             </a:fld>
             <a:endParaRPr lang="en-US"/>
           </a:p>
@@ -1233,7 +1233,7 @@
           <a:p>
             <a:fld id="{E5CACD5D-5136-124F-89D7-18C7BEDAA641}" type="datetimeFigureOut">
               <a:rPr lang="en-US" smtClean="0"/>
-              <a:t>1/14/19</a:t>
+              <a:t>2/27/19</a:t>
             </a:fld>
             <a:endParaRPr lang="en-US"/>
           </a:p>
@@ -1597,7 +1597,7 @@
           <a:p>
             <a:fld id="{E5CACD5D-5136-124F-89D7-18C7BEDAA641}" type="datetimeFigureOut">
               <a:rPr lang="en-US" smtClean="0"/>
-              <a:t>1/14/19</a:t>
+              <a:t>2/27/19</a:t>
             </a:fld>
             <a:endParaRPr lang="en-US"/>
           </a:p>
@@ -1714,7 +1714,7 @@
           <a:p>
             <a:fld id="{E5CACD5D-5136-124F-89D7-18C7BEDAA641}" type="datetimeFigureOut">
               <a:rPr lang="en-US" smtClean="0"/>
-              <a:t>1/14/19</a:t>
+              <a:t>2/27/19</a:t>
             </a:fld>
             <a:endParaRPr lang="en-US"/>
           </a:p>
@@ -1809,7 +1809,7 @@
           <a:p>
             <a:fld id="{E5CACD5D-5136-124F-89D7-18C7BEDAA641}" type="datetimeFigureOut">
               <a:rPr lang="en-US" smtClean="0"/>
-              <a:t>1/14/19</a:t>
+              <a:t>2/27/19</a:t>
             </a:fld>
             <a:endParaRPr lang="en-US"/>
           </a:p>
@@ -2084,7 +2084,7 @@
           <a:p>
             <a:fld id="{E5CACD5D-5136-124F-89D7-18C7BEDAA641}" type="datetimeFigureOut">
               <a:rPr lang="en-US" smtClean="0"/>
-              <a:t>1/14/19</a:t>
+              <a:t>2/27/19</a:t>
             </a:fld>
             <a:endParaRPr lang="en-US"/>
           </a:p>
@@ -2336,7 +2336,7 @@
           <a:p>
             <a:fld id="{E5CACD5D-5136-124F-89D7-18C7BEDAA641}" type="datetimeFigureOut">
               <a:rPr lang="en-US" smtClean="0"/>
-              <a:t>1/14/19</a:t>
+              <a:t>2/27/19</a:t>
             </a:fld>
             <a:endParaRPr lang="en-US"/>
           </a:p>
@@ -2547,7 +2547,7 @@
           <a:p>
             <a:fld id="{E5CACD5D-5136-124F-89D7-18C7BEDAA641}" type="datetimeFigureOut">
               <a:rPr lang="en-US" smtClean="0"/>
-              <a:t>1/14/19</a:t>
+              <a:t>2/27/19</a:t>
             </a:fld>
             <a:endParaRPr lang="en-US"/>
           </a:p>
@@ -3088,7 +3088,7 @@
         </p:blipFill>
         <p:spPr>
           <a:xfrm>
-            <a:off x="278893" y="256033"/>
+            <a:off x="278891" y="243148"/>
             <a:ext cx="11681459" cy="6371704"/>
           </a:xfrm>
           <a:prstGeom prst="rect">
@@ -3096,36 +3096,103 @@
           </a:prstGeom>
         </p:spPr>
       </p:pic>
-      <p:pic>
-        <p:nvPicPr>
-          <p:cNvPr id="6" name="Picture 5">
+      <p:grpSp>
+        <p:nvGrpSpPr>
+          <p:cNvPr id="5" name="Group 4">
             <a:extLst>
               <a:ext uri="{FF2B5EF4-FFF2-40B4-BE49-F238E27FC236}">
-                <a16:creationId xmlns:a16="http://schemas.microsoft.com/office/drawing/2014/main" id="{39E7150A-638B-5C42-B3A3-A773A239F5D4}"/>
+                <a16:creationId xmlns:a16="http://schemas.microsoft.com/office/drawing/2014/main" id="{CC904864-A821-474B-B57D-E1DEDBDEA555}"/>
               </a:ext>
             </a:extLst>
           </p:cNvPr>
-          <p:cNvPicPr>
-            <a:picLocks noChangeAspect="1"/>
-          </p:cNvPicPr>
+          <p:cNvGrpSpPr/>
           <p:nvPr/>
-        </p:nvPicPr>
-        <p:blipFill>
-          <a:blip r:embed="rId3"/>
-          <a:stretch>
-            <a:fillRect/>
-          </a:stretch>
-        </p:blipFill>
-        <p:spPr>
+        </p:nvGrpSpPr>
+        <p:grpSpPr>
           <a:xfrm>
-            <a:off x="5581512" y="3746754"/>
-            <a:ext cx="711200" cy="711200"/>
+            <a:off x="2519297" y="4036629"/>
+            <a:ext cx="7200650" cy="2239099"/>
+            <a:chOff x="3711142" y="2425218"/>
+            <a:chExt cx="6858083" cy="2239099"/>
           </a:xfrm>
-          <a:prstGeom prst="rect">
-            <a:avLst/>
-          </a:prstGeom>
-        </p:spPr>
-      </p:pic>
+        </p:grpSpPr>
+        <p:pic>
+          <p:nvPicPr>
+            <p:cNvPr id="7" name="Picture 6">
+              <a:extLst>
+                <a:ext uri="{FF2B5EF4-FFF2-40B4-BE49-F238E27FC236}">
+                  <a16:creationId xmlns:a16="http://schemas.microsoft.com/office/drawing/2014/main" id="{50CE4576-58A6-BA46-8CF8-3B09DAAA020A}"/>
+                </a:ext>
+              </a:extLst>
+            </p:cNvPr>
+            <p:cNvPicPr>
+              <a:picLocks noChangeAspect="1"/>
+            </p:cNvPicPr>
+            <p:nvPr/>
+          </p:nvPicPr>
+          <p:blipFill>
+            <a:blip r:embed="rId3"/>
+            <a:stretch>
+              <a:fillRect/>
+            </a:stretch>
+          </p:blipFill>
+          <p:spPr>
+            <a:xfrm>
+              <a:off x="6784583" y="2425218"/>
+              <a:ext cx="711200" cy="711200"/>
+            </a:xfrm>
+            <a:prstGeom prst="rect">
+              <a:avLst/>
+            </a:prstGeom>
+          </p:spPr>
+        </p:pic>
+        <p:sp>
+          <p:nvSpPr>
+            <p:cNvPr id="8" name="TextBox 7">
+              <a:extLst>
+                <a:ext uri="{FF2B5EF4-FFF2-40B4-BE49-F238E27FC236}">
+                  <a16:creationId xmlns:a16="http://schemas.microsoft.com/office/drawing/2014/main" id="{52371C37-2015-5144-B321-E2F5F4249466}"/>
+                </a:ext>
+              </a:extLst>
+            </p:cNvPr>
+            <p:cNvSpPr txBox="1"/>
+            <p:nvPr/>
+          </p:nvSpPr>
+          <p:spPr>
+            <a:xfrm>
+              <a:off x="3711142" y="3556321"/>
+              <a:ext cx="6858083" cy="1107996"/>
+            </a:xfrm>
+            <a:prstGeom prst="rect">
+              <a:avLst/>
+            </a:prstGeom>
+          </p:spPr>
+          <p:txBody>
+            <a:bodyPr wrap="square" lIns="0" tIns="0" rIns="0" bIns="0" rtlCol="0">
+              <a:spAutoFit/>
+            </a:bodyPr>
+            <a:lstStyle/>
+            <a:p>
+              <a:pPr algn="ctr">
+                <a:spcAft>
+                  <a:spcPts val="600"/>
+                </a:spcAft>
+              </a:pPr>
+              <a:r>
+                <a:rPr lang="en-US" sz="3600" dirty="0">
+                  <a:solidFill>
+                    <a:schemeClr val="bg1"/>
+                  </a:solidFill>
+                  <a:latin typeface="Trebuchet MS" charset="0"/>
+                  <a:ea typeface="Trebuchet MS" charset="0"/>
+                  <a:cs typeface="Trebuchet MS" charset="0"/>
+                </a:rPr>
+                <a:t>Distributed Tracing with Wavefront</a:t>
+              </a:r>
+            </a:p>
+          </p:txBody>
+        </p:sp>
+      </p:grpSp>
     </p:spTree>
     <p:extLst>
       <p:ext uri="{BB962C8B-B14F-4D97-AF65-F5344CB8AC3E}">
@@ -3307,7 +3374,7 @@
         </p:blipFill>
         <p:spPr>
           <a:xfrm>
-            <a:off x="201612" y="152400"/>
+            <a:off x="203200" y="152400"/>
             <a:ext cx="11785600" cy="6553200"/>
           </a:xfrm>
           <a:prstGeom prst="rect">

</xml_diff>